<commit_message>
sa bahay nalang daw
</commit_message>
<xml_diff>
--- a/long test midterm/yes.pptx
+++ b/long test midterm/yes.pptx
@@ -6,7 +6,8 @@
   </p:sldMasterIdLst>
   <p:sldIdLst>
     <p:sldId id="256" r:id="rId2"/>
-    <p:sldId id="257" r:id="rId3"/>
+    <p:sldId id="258" r:id="rId3"/>
+    <p:sldId id="259" r:id="rId4"/>
   </p:sldIdLst>
   <p:sldSz cx="12192000" cy="6858000"/>
   <p:notesSz cx="6858000" cy="9144000"/>
@@ -105,6 +106,11 @@
       </a:defRPr>
     </a:lvl9pPr>
   </p:defaultTextStyle>
+  <p:extLst>
+    <p:ext uri="{EFAFB233-063F-42B5-8137-9DF3F51BA10A}">
+      <p15:sldGuideLst xmlns:p15="http://schemas.microsoft.com/office/powerpoint/2012/main"/>
+    </p:ext>
+  </p:extLst>
 </p:presentation>
 </file>
 
@@ -3324,10 +3330,10 @@
       </p:grpSpPr>
       <p:sp>
         <p:nvSpPr>
-          <p:cNvPr id="4" name="Oval 3">
-            <a:extLst>
-              <a:ext uri="{FF2B5EF4-FFF2-40B4-BE49-F238E27FC236}">
-                <a16:creationId xmlns:a16="http://schemas.microsoft.com/office/drawing/2014/main" id="{3E2ED4DB-FAD7-36C9-D613-441D008FF821}"/>
+          <p:cNvPr id="18" name="Rectangle 17">
+            <a:extLst>
+              <a:ext uri="{FF2B5EF4-FFF2-40B4-BE49-F238E27FC236}">
+                <a16:creationId xmlns:a16="http://schemas.microsoft.com/office/drawing/2014/main" id="{C603DB2A-DEF6-40F1-BC5B-57D1097EFA3B}"/>
               </a:ext>
             </a:extLst>
           </p:cNvPr>
@@ -3336,8 +3342,59 @@
         </p:nvSpPr>
         <p:spPr>
           <a:xfrm>
-            <a:off x="331305" y="278295"/>
-            <a:ext cx="3657600" cy="3670853"/>
+            <a:off x="0" y="0"/>
+            <a:ext cx="1205345" cy="6858000"/>
+          </a:xfrm>
+          <a:prstGeom prst="rect">
+            <a:avLst/>
+          </a:prstGeom>
+          <a:solidFill>
+            <a:schemeClr val="accent5">
+              <a:lumMod val="50000"/>
+            </a:schemeClr>
+          </a:solidFill>
+        </p:spPr>
+        <p:style>
+          <a:lnRef idx="2">
+            <a:schemeClr val="accent1">
+              <a:shade val="50000"/>
+            </a:schemeClr>
+          </a:lnRef>
+          <a:fillRef idx="1">
+            <a:schemeClr val="accent1"/>
+          </a:fillRef>
+          <a:effectRef idx="0">
+            <a:schemeClr val="accent1"/>
+          </a:effectRef>
+          <a:fontRef idx="minor">
+            <a:schemeClr val="lt1"/>
+          </a:fontRef>
+        </p:style>
+        <p:txBody>
+          <a:bodyPr rtlCol="0" anchor="ctr"/>
+          <a:lstStyle/>
+          <a:p>
+            <a:pPr algn="ctr"/>
+            <a:endParaRPr lang="en-PH"/>
+          </a:p>
+        </p:txBody>
+      </p:sp>
+      <p:sp>
+        <p:nvSpPr>
+          <p:cNvPr id="4" name="Oval 3">
+            <a:extLst>
+              <a:ext uri="{FF2B5EF4-FFF2-40B4-BE49-F238E27FC236}">
+                <a16:creationId xmlns:a16="http://schemas.microsoft.com/office/drawing/2014/main" id="{3E2ED4DB-FAD7-36C9-D613-441D008FF821}"/>
+              </a:ext>
+            </a:extLst>
+          </p:cNvPr>
+          <p:cNvSpPr/>
+          <p:nvPr/>
+        </p:nvSpPr>
+        <p:spPr>
+          <a:xfrm>
+            <a:off x="3962400" y="201278"/>
+            <a:ext cx="4811657" cy="4758732"/>
           </a:xfrm>
           <a:prstGeom prst="ellipse">
             <a:avLst/>
@@ -3398,7 +3455,7 @@
         </p:nvSpPr>
         <p:spPr>
           <a:xfrm>
-            <a:off x="3087754" y="3429000"/>
+            <a:off x="2713682" y="4758732"/>
             <a:ext cx="8931966" cy="1569660"/>
           </a:xfrm>
           <a:prstGeom prst="rect">
@@ -3418,6 +3475,519 @@
               </a:rPr>
               <a:t>Clarisse Justine D. Crisostomo</a:t>
             </a:r>
+          </a:p>
+        </p:txBody>
+      </p:sp>
+      <p:pic>
+        <p:nvPicPr>
+          <p:cNvPr id="3" name="Graphic 2" descr="House">
+            <a:extLst>
+              <a:ext uri="{FF2B5EF4-FFF2-40B4-BE49-F238E27FC236}">
+                <a16:creationId xmlns:a16="http://schemas.microsoft.com/office/drawing/2014/main" id="{AA05D0AE-52B9-4584-A1AC-0C2D91F6F2E9}"/>
+              </a:ext>
+            </a:extLst>
+          </p:cNvPr>
+          <p:cNvPicPr>
+            <a:picLocks noChangeAspect="1"/>
+          </p:cNvPicPr>
+          <p:nvPr/>
+        </p:nvPicPr>
+        <p:blipFill>
+          <a:blip r:embed="rId3">
+            <a:extLst>
+              <a:ext uri="{28A0092B-C50C-407E-A947-70E740481C1C}">
+                <a14:useLocalDpi xmlns:a14="http://schemas.microsoft.com/office/drawing/2010/main" val="0"/>
+              </a:ext>
+              <a:ext uri="{96DAC541-7B7A-43D3-8B79-37D633B846F1}">
+                <asvg:svgBlip xmlns:asvg="http://schemas.microsoft.com/office/drawing/2016/SVG/main" r:embed="rId4"/>
+              </a:ext>
+            </a:extLst>
+          </a:blip>
+          <a:stretch>
+            <a:fillRect/>
+          </a:stretch>
+        </p:blipFill>
+        <p:spPr>
+          <a:xfrm>
+            <a:off x="314525" y="2455953"/>
+            <a:ext cx="540000" cy="540000"/>
+          </a:xfrm>
+          <a:prstGeom prst="rect">
+            <a:avLst/>
+          </a:prstGeom>
+        </p:spPr>
+      </p:pic>
+      <p:pic>
+        <p:nvPicPr>
+          <p:cNvPr id="7" name="Graphic 6" descr="Employee badge">
+            <a:hlinkClick r:id="rId5" action="ppaction://hlinksldjump"/>
+            <a:extLst>
+              <a:ext uri="{FF2B5EF4-FFF2-40B4-BE49-F238E27FC236}">
+                <a16:creationId xmlns:a16="http://schemas.microsoft.com/office/drawing/2014/main" id="{3FFD2829-FD15-428B-9CF5-62BE1DAD7FF9}"/>
+              </a:ext>
+            </a:extLst>
+          </p:cNvPr>
+          <p:cNvPicPr>
+            <a:picLocks noChangeAspect="1"/>
+          </p:cNvPicPr>
+          <p:nvPr/>
+        </p:nvPicPr>
+        <p:blipFill>
+          <a:blip r:embed="rId6">
+            <a:extLst>
+              <a:ext uri="{28A0092B-C50C-407E-A947-70E740481C1C}">
+                <a14:useLocalDpi xmlns:a14="http://schemas.microsoft.com/office/drawing/2010/main" val="0"/>
+              </a:ext>
+              <a:ext uri="{96DAC541-7B7A-43D3-8B79-37D633B846F1}">
+                <asvg:svgBlip xmlns:asvg="http://schemas.microsoft.com/office/drawing/2016/SVG/main" r:embed="rId7"/>
+              </a:ext>
+            </a:extLst>
+          </a:blip>
+          <a:stretch>
+            <a:fillRect/>
+          </a:stretch>
+        </p:blipFill>
+        <p:spPr>
+          <a:xfrm>
+            <a:off x="314525" y="386728"/>
+            <a:ext cx="540000" cy="540000"/>
+          </a:xfrm>
+          <a:prstGeom prst="rect">
+            <a:avLst/>
+          </a:prstGeom>
+        </p:spPr>
+      </p:pic>
+      <p:pic>
+        <p:nvPicPr>
+          <p:cNvPr id="11" name="Graphic 10" descr="Star">
+            <a:hlinkClick r:id="rId8" action="ppaction://hlinksldjump"/>
+            <a:extLst>
+              <a:ext uri="{FF2B5EF4-FFF2-40B4-BE49-F238E27FC236}">
+                <a16:creationId xmlns:a16="http://schemas.microsoft.com/office/drawing/2014/main" id="{4CFFDE08-8C8E-4F00-A16E-E93193EB916E}"/>
+              </a:ext>
+            </a:extLst>
+          </p:cNvPr>
+          <p:cNvPicPr>
+            <a:picLocks noChangeAspect="1"/>
+          </p:cNvPicPr>
+          <p:nvPr/>
+        </p:nvPicPr>
+        <p:blipFill>
+          <a:blip r:embed="rId9">
+            <a:extLst>
+              <a:ext uri="{28A0092B-C50C-407E-A947-70E740481C1C}">
+                <a14:useLocalDpi xmlns:a14="http://schemas.microsoft.com/office/drawing/2010/main" val="0"/>
+              </a:ext>
+              <a:ext uri="{96DAC541-7B7A-43D3-8B79-37D633B846F1}">
+                <asvg:svgBlip xmlns:asvg="http://schemas.microsoft.com/office/drawing/2016/SVG/main" r:embed="rId10"/>
+              </a:ext>
+            </a:extLst>
+          </a:blip>
+          <a:stretch>
+            <a:fillRect/>
+          </a:stretch>
+        </p:blipFill>
+        <p:spPr>
+          <a:xfrm>
+            <a:off x="314525" y="1386705"/>
+            <a:ext cx="540000" cy="540000"/>
+          </a:xfrm>
+          <a:prstGeom prst="rect">
+            <a:avLst/>
+          </a:prstGeom>
+        </p:spPr>
+      </p:pic>
+      <p:pic>
+        <p:nvPicPr>
+          <p:cNvPr id="13" name="Graphic 12" descr="Cake">
+            <a:extLst>
+              <a:ext uri="{FF2B5EF4-FFF2-40B4-BE49-F238E27FC236}">
+                <a16:creationId xmlns:a16="http://schemas.microsoft.com/office/drawing/2014/main" id="{13FA19D8-D5D5-414E-9ED8-7BC64241534A}"/>
+              </a:ext>
+            </a:extLst>
+          </p:cNvPr>
+          <p:cNvPicPr>
+            <a:picLocks noChangeAspect="1"/>
+          </p:cNvPicPr>
+          <p:nvPr/>
+        </p:nvPicPr>
+        <p:blipFill>
+          <a:blip r:embed="rId11">
+            <a:extLst>
+              <a:ext uri="{28A0092B-C50C-407E-A947-70E740481C1C}">
+                <a14:useLocalDpi xmlns:a14="http://schemas.microsoft.com/office/drawing/2010/main" val="0"/>
+              </a:ext>
+              <a:ext uri="{96DAC541-7B7A-43D3-8B79-37D633B846F1}">
+                <asvg:svgBlip xmlns:asvg="http://schemas.microsoft.com/office/drawing/2016/SVG/main" r:embed="rId12"/>
+              </a:ext>
+            </a:extLst>
+          </a:blip>
+          <a:stretch>
+            <a:fillRect/>
+          </a:stretch>
+        </p:blipFill>
+        <p:spPr>
+          <a:xfrm>
+            <a:off x="314525" y="3622183"/>
+            <a:ext cx="540000" cy="540000"/>
+          </a:xfrm>
+          <a:prstGeom prst="rect">
+            <a:avLst/>
+          </a:prstGeom>
+        </p:spPr>
+      </p:pic>
+      <p:pic>
+        <p:nvPicPr>
+          <p:cNvPr id="15" name="Graphic 14" descr="Game controller">
+            <a:extLst>
+              <a:ext uri="{FF2B5EF4-FFF2-40B4-BE49-F238E27FC236}">
+                <a16:creationId xmlns:a16="http://schemas.microsoft.com/office/drawing/2014/main" id="{9B61377B-EF05-4C85-A3CA-870BAD92EFD3}"/>
+              </a:ext>
+            </a:extLst>
+          </p:cNvPr>
+          <p:cNvPicPr>
+            <a:picLocks noChangeAspect="1"/>
+          </p:cNvPicPr>
+          <p:nvPr/>
+        </p:nvPicPr>
+        <p:blipFill>
+          <a:blip r:embed="rId13">
+            <a:extLst>
+              <a:ext uri="{28A0092B-C50C-407E-A947-70E740481C1C}">
+                <a14:useLocalDpi xmlns:a14="http://schemas.microsoft.com/office/drawing/2010/main" val="0"/>
+              </a:ext>
+              <a:ext uri="{96DAC541-7B7A-43D3-8B79-37D633B846F1}">
+                <asvg:svgBlip xmlns:asvg="http://schemas.microsoft.com/office/drawing/2016/SVG/main" r:embed="rId14"/>
+              </a:ext>
+            </a:extLst>
+          </a:blip>
+          <a:stretch>
+            <a:fillRect/>
+          </a:stretch>
+        </p:blipFill>
+        <p:spPr>
+          <a:xfrm>
+            <a:off x="314525" y="4788406"/>
+            <a:ext cx="540000" cy="540000"/>
+          </a:xfrm>
+          <a:prstGeom prst="rect">
+            <a:avLst/>
+          </a:prstGeom>
+        </p:spPr>
+      </p:pic>
+      <p:pic>
+        <p:nvPicPr>
+          <p:cNvPr id="17" name="Graphic 16" descr="Graduation cap">
+            <a:extLst>
+              <a:ext uri="{FF2B5EF4-FFF2-40B4-BE49-F238E27FC236}">
+                <a16:creationId xmlns:a16="http://schemas.microsoft.com/office/drawing/2014/main" id="{09285616-36D5-4147-A29A-BAA22927A959}"/>
+              </a:ext>
+            </a:extLst>
+          </p:cNvPr>
+          <p:cNvPicPr>
+            <a:picLocks noChangeAspect="1"/>
+          </p:cNvPicPr>
+          <p:nvPr/>
+        </p:nvPicPr>
+        <p:blipFill>
+          <a:blip r:embed="rId15">
+            <a:extLst>
+              <a:ext uri="{28A0092B-C50C-407E-A947-70E740481C1C}">
+                <a14:useLocalDpi xmlns:a14="http://schemas.microsoft.com/office/drawing/2010/main" val="0"/>
+              </a:ext>
+              <a:ext uri="{96DAC541-7B7A-43D3-8B79-37D633B846F1}">
+                <asvg:svgBlip xmlns:asvg="http://schemas.microsoft.com/office/drawing/2016/SVG/main" r:embed="rId16"/>
+              </a:ext>
+            </a:extLst>
+          </a:blip>
+          <a:stretch>
+            <a:fillRect/>
+          </a:stretch>
+        </p:blipFill>
+        <p:spPr>
+          <a:xfrm>
+            <a:off x="314525" y="5788392"/>
+            <a:ext cx="540000" cy="540000"/>
+          </a:xfrm>
+          <a:prstGeom prst="rect">
+            <a:avLst/>
+          </a:prstGeom>
+        </p:spPr>
+      </p:pic>
+      <p:sp>
+        <p:nvSpPr>
+          <p:cNvPr id="22" name="Rectangle 21">
+            <a:extLst>
+              <a:ext uri="{FF2B5EF4-FFF2-40B4-BE49-F238E27FC236}">
+                <a16:creationId xmlns:a16="http://schemas.microsoft.com/office/drawing/2014/main" id="{6C344107-E5B0-4657-A433-ED5C7EB529BC}"/>
+              </a:ext>
+            </a:extLst>
+          </p:cNvPr>
+          <p:cNvSpPr/>
+          <p:nvPr/>
+        </p:nvSpPr>
+        <p:spPr>
+          <a:xfrm>
+            <a:off x="12894366" y="1386705"/>
+            <a:ext cx="2788893" cy="4712072"/>
+          </a:xfrm>
+          <a:prstGeom prst="rect">
+            <a:avLst/>
+          </a:prstGeom>
+          <a:solidFill>
+            <a:schemeClr val="accent5">
+              <a:lumMod val="40000"/>
+              <a:lumOff val="60000"/>
+            </a:schemeClr>
+          </a:solidFill>
+          <a:ln>
+            <a:noFill/>
+          </a:ln>
+        </p:spPr>
+        <p:style>
+          <a:lnRef idx="2">
+            <a:schemeClr val="accent1">
+              <a:shade val="50000"/>
+            </a:schemeClr>
+          </a:lnRef>
+          <a:fillRef idx="1">
+            <a:schemeClr val="accent1"/>
+          </a:fillRef>
+          <a:effectRef idx="0">
+            <a:schemeClr val="accent1"/>
+          </a:effectRef>
+          <a:fontRef idx="minor">
+            <a:schemeClr val="lt1"/>
+          </a:fontRef>
+        </p:style>
+        <p:txBody>
+          <a:bodyPr rtlCol="0" anchor="ctr"/>
+          <a:lstStyle/>
+          <a:p>
+            <a:pPr algn="ctr"/>
+            <a:endParaRPr lang="en-PH"/>
+          </a:p>
+        </p:txBody>
+      </p:sp>
+      <p:sp>
+        <p:nvSpPr>
+          <p:cNvPr id="23" name="Rectangle 22">
+            <a:extLst>
+              <a:ext uri="{FF2B5EF4-FFF2-40B4-BE49-F238E27FC236}">
+                <a16:creationId xmlns:a16="http://schemas.microsoft.com/office/drawing/2014/main" id="{DA1776AD-B598-4B7D-9208-245D9C1F6A80}"/>
+              </a:ext>
+            </a:extLst>
+          </p:cNvPr>
+          <p:cNvSpPr/>
+          <p:nvPr/>
+        </p:nvSpPr>
+        <p:spPr>
+          <a:xfrm>
+            <a:off x="15928511" y="1386705"/>
+            <a:ext cx="2788893" cy="4712072"/>
+          </a:xfrm>
+          <a:prstGeom prst="rect">
+            <a:avLst/>
+          </a:prstGeom>
+          <a:blipFill dpi="0" rotWithShape="1">
+            <a:blip r:embed="rId17">
+              <a:extLst>
+                <a:ext uri="{28A0092B-C50C-407E-A947-70E740481C1C}">
+                  <a14:useLocalDpi xmlns:a14="http://schemas.microsoft.com/office/drawing/2010/main" val="0"/>
+                </a:ext>
+              </a:extLst>
+            </a:blip>
+            <a:srcRect/>
+            <a:stretch>
+              <a:fillRect/>
+            </a:stretch>
+          </a:blipFill>
+          <a:ln>
+            <a:noFill/>
+          </a:ln>
+        </p:spPr>
+        <p:style>
+          <a:lnRef idx="2">
+            <a:schemeClr val="accent1">
+              <a:shade val="50000"/>
+            </a:schemeClr>
+          </a:lnRef>
+          <a:fillRef idx="1">
+            <a:schemeClr val="accent1"/>
+          </a:fillRef>
+          <a:effectRef idx="0">
+            <a:schemeClr val="accent1"/>
+          </a:effectRef>
+          <a:fontRef idx="minor">
+            <a:schemeClr val="lt1"/>
+          </a:fontRef>
+        </p:style>
+        <p:txBody>
+          <a:bodyPr rtlCol="0" anchor="ctr"/>
+          <a:lstStyle/>
+          <a:p>
+            <a:pPr algn="ctr"/>
+            <a:endParaRPr lang="en-PH"/>
+          </a:p>
+        </p:txBody>
+      </p:sp>
+      <p:sp>
+        <p:nvSpPr>
+          <p:cNvPr id="24" name="Rectangle 23">
+            <a:extLst>
+              <a:ext uri="{FF2B5EF4-FFF2-40B4-BE49-F238E27FC236}">
+                <a16:creationId xmlns:a16="http://schemas.microsoft.com/office/drawing/2014/main" id="{2DE25498-327B-4B20-8DB1-9D36E095AA21}"/>
+              </a:ext>
+            </a:extLst>
+          </p:cNvPr>
+          <p:cNvSpPr/>
+          <p:nvPr/>
+        </p:nvSpPr>
+        <p:spPr>
+          <a:xfrm>
+            <a:off x="18962656" y="1386705"/>
+            <a:ext cx="2788893" cy="4712072"/>
+          </a:xfrm>
+          <a:prstGeom prst="rect">
+            <a:avLst/>
+          </a:prstGeom>
+          <a:solidFill>
+            <a:schemeClr val="accent5">
+              <a:lumMod val="40000"/>
+              <a:lumOff val="60000"/>
+            </a:schemeClr>
+          </a:solidFill>
+          <a:ln>
+            <a:noFill/>
+          </a:ln>
+        </p:spPr>
+        <p:style>
+          <a:lnRef idx="2">
+            <a:schemeClr val="accent1">
+              <a:shade val="50000"/>
+            </a:schemeClr>
+          </a:lnRef>
+          <a:fillRef idx="1">
+            <a:schemeClr val="accent1"/>
+          </a:fillRef>
+          <a:effectRef idx="0">
+            <a:schemeClr val="accent1"/>
+          </a:effectRef>
+          <a:fontRef idx="minor">
+            <a:schemeClr val="lt1"/>
+          </a:fontRef>
+        </p:style>
+        <p:txBody>
+          <a:bodyPr rtlCol="0" anchor="ctr"/>
+          <a:lstStyle/>
+          <a:p>
+            <a:pPr algn="ctr"/>
+            <a:endParaRPr lang="en-PH"/>
+          </a:p>
+        </p:txBody>
+      </p:sp>
+      <p:sp>
+        <p:nvSpPr>
+          <p:cNvPr id="25" name="TextBox 24">
+            <a:extLst>
+              <a:ext uri="{FF2B5EF4-FFF2-40B4-BE49-F238E27FC236}">
+                <a16:creationId xmlns:a16="http://schemas.microsoft.com/office/drawing/2014/main" id="{4FF55205-8DE6-4052-BDDF-17659F34BDB3}"/>
+              </a:ext>
+            </a:extLst>
+          </p:cNvPr>
+          <p:cNvSpPr txBox="1"/>
+          <p:nvPr/>
+        </p:nvSpPr>
+        <p:spPr>
+          <a:xfrm>
+            <a:off x="13047840" y="1638496"/>
+            <a:ext cx="2481943" cy="4401205"/>
+          </a:xfrm>
+          <a:prstGeom prst="rect">
+            <a:avLst/>
+          </a:prstGeom>
+          <a:noFill/>
+        </p:spPr>
+        <p:txBody>
+          <a:bodyPr wrap="square" rtlCol="0">
+            <a:spAutoFit/>
+          </a:bodyPr>
+          <a:lstStyle/>
+          <a:p>
+            <a:r>
+              <a:rPr lang="en-US" sz="2800" dirty="0"/>
+              <a:t>My name is Clarisse Justine D. Crisostomo</a:t>
+            </a:r>
+          </a:p>
+          <a:p>
+            <a:endParaRPr lang="en-US" sz="2800" dirty="0"/>
+          </a:p>
+          <a:p>
+            <a:r>
+              <a:rPr lang="en-PH" sz="2800" dirty="0"/>
+              <a:t>Born on April 6</a:t>
+            </a:r>
+            <a:r>
+              <a:rPr lang="en-PH" sz="2800" baseline="30000" dirty="0"/>
+              <a:t>th</a:t>
+            </a:r>
+            <a:r>
+              <a:rPr lang="en-PH" sz="2800" dirty="0"/>
+              <a:t> 2000</a:t>
+            </a:r>
+          </a:p>
+          <a:p>
+            <a:endParaRPr lang="en-PH" sz="2800" dirty="0"/>
+          </a:p>
+          <a:p>
+            <a:r>
+              <a:rPr lang="en-PH" sz="2800" dirty="0"/>
+              <a:t>I currently live in </a:t>
+            </a:r>
+            <a:r>
+              <a:rPr lang="en-PH" sz="2800" dirty="0" err="1"/>
+              <a:t>Abucay</a:t>
+            </a:r>
+            <a:r>
+              <a:rPr lang="en-PH" sz="2800" dirty="0"/>
+              <a:t> Bataan.</a:t>
+            </a:r>
+          </a:p>
+        </p:txBody>
+      </p:sp>
+      <p:sp>
+        <p:nvSpPr>
+          <p:cNvPr id="26" name="TextBox 25">
+            <a:extLst>
+              <a:ext uri="{FF2B5EF4-FFF2-40B4-BE49-F238E27FC236}">
+                <a16:creationId xmlns:a16="http://schemas.microsoft.com/office/drawing/2014/main" id="{B04345E3-CDF8-4BE9-828F-60D7E34657B7}"/>
+              </a:ext>
+            </a:extLst>
+          </p:cNvPr>
+          <p:cNvSpPr txBox="1"/>
+          <p:nvPr/>
+        </p:nvSpPr>
+        <p:spPr>
+          <a:xfrm>
+            <a:off x="19116130" y="2619356"/>
+            <a:ext cx="2481943" cy="2246769"/>
+          </a:xfrm>
+          <a:prstGeom prst="rect">
+            <a:avLst/>
+          </a:prstGeom>
+          <a:noFill/>
+        </p:spPr>
+        <p:txBody>
+          <a:bodyPr wrap="square" rtlCol="0">
+            <a:spAutoFit/>
+          </a:bodyPr>
+          <a:lstStyle/>
+          <a:p>
+            <a:r>
+              <a:rPr lang="en-US" sz="2800"/>
+              <a:t> “I am Qiqi. I am a zombie. And I forgot what comes next.” – Qiqi</a:t>
+            </a:r>
+            <a:endParaRPr lang="en-PH" sz="2800" dirty="0"/>
           </a:p>
         </p:txBody>
       </p:sp>
@@ -3431,6 +4001,18 @@
   <p:clrMapOvr>
     <a:masterClrMapping/>
   </p:clrMapOvr>
+  <mc:AlternateContent xmlns:mc="http://schemas.openxmlformats.org/markup-compatibility/2006">
+    <mc:Choice xmlns:p159="http://schemas.microsoft.com/office/powerpoint/2015/09/main" Requires="p159">
+      <p:transition xmlns:p14="http://schemas.microsoft.com/office/powerpoint/2010/main" spd="slow" p14:dur="2000">
+        <p159:morph option="byObject"/>
+      </p:transition>
+    </mc:Choice>
+    <mc:Fallback>
+      <p:transition spd="slow">
+        <p:fade/>
+      </p:transition>
+    </mc:Fallback>
+  </mc:AlternateContent>
 </p:sld>
 </file>
 
@@ -3451,16 +4033,1116 @@
           <a:chExt cx="0" cy="0"/>
         </a:xfrm>
       </p:grpSpPr>
+      <p:sp>
+        <p:nvSpPr>
+          <p:cNvPr id="18" name="Rectangle 17">
+            <a:extLst>
+              <a:ext uri="{FF2B5EF4-FFF2-40B4-BE49-F238E27FC236}">
+                <a16:creationId xmlns:a16="http://schemas.microsoft.com/office/drawing/2014/main" id="{C603DB2A-DEF6-40F1-BC5B-57D1097EFA3B}"/>
+              </a:ext>
+            </a:extLst>
+          </p:cNvPr>
+          <p:cNvSpPr/>
+          <p:nvPr/>
+        </p:nvSpPr>
+        <p:spPr>
+          <a:xfrm>
+            <a:off x="0" y="0"/>
+            <a:ext cx="1205345" cy="6858000"/>
+          </a:xfrm>
+          <a:prstGeom prst="rect">
+            <a:avLst/>
+          </a:prstGeom>
+          <a:solidFill>
+            <a:schemeClr val="accent5">
+              <a:lumMod val="50000"/>
+            </a:schemeClr>
+          </a:solidFill>
+        </p:spPr>
+        <p:style>
+          <a:lnRef idx="2">
+            <a:schemeClr val="accent1">
+              <a:shade val="50000"/>
+            </a:schemeClr>
+          </a:lnRef>
+          <a:fillRef idx="1">
+            <a:schemeClr val="accent1"/>
+          </a:fillRef>
+          <a:effectRef idx="0">
+            <a:schemeClr val="accent1"/>
+          </a:effectRef>
+          <a:fontRef idx="minor">
+            <a:schemeClr val="lt1"/>
+          </a:fontRef>
+        </p:style>
+        <p:txBody>
+          <a:bodyPr rtlCol="0" anchor="ctr"/>
+          <a:lstStyle/>
+          <a:p>
+            <a:pPr algn="ctr"/>
+            <a:endParaRPr lang="en-PH"/>
+          </a:p>
+        </p:txBody>
+      </p:sp>
+      <p:sp>
+        <p:nvSpPr>
+          <p:cNvPr id="4" name="Oval 3">
+            <a:extLst>
+              <a:ext uri="{FF2B5EF4-FFF2-40B4-BE49-F238E27FC236}">
+                <a16:creationId xmlns:a16="http://schemas.microsoft.com/office/drawing/2014/main" id="{3E2ED4DB-FAD7-36C9-D613-441D008FF821}"/>
+              </a:ext>
+            </a:extLst>
+          </p:cNvPr>
+          <p:cNvSpPr/>
+          <p:nvPr/>
+        </p:nvSpPr>
+        <p:spPr>
+          <a:xfrm>
+            <a:off x="10866094" y="64014"/>
+            <a:ext cx="1205345" cy="1185427"/>
+          </a:xfrm>
+          <a:prstGeom prst="ellipse">
+            <a:avLst/>
+          </a:prstGeom>
+          <a:blipFill dpi="0" rotWithShape="1">
+            <a:blip r:embed="rId2">
+              <a:extLst>
+                <a:ext uri="{28A0092B-C50C-407E-A947-70E740481C1C}">
+                  <a14:useLocalDpi xmlns:a14="http://schemas.microsoft.com/office/drawing/2010/main" val="0"/>
+                </a:ext>
+              </a:extLst>
+            </a:blip>
+            <a:srcRect/>
+            <a:stretch>
+              <a:fillRect/>
+            </a:stretch>
+          </a:blipFill>
+          <a:ln>
+            <a:noFill/>
+          </a:ln>
+        </p:spPr>
+        <p:style>
+          <a:lnRef idx="2">
+            <a:schemeClr val="accent1">
+              <a:shade val="50000"/>
+            </a:schemeClr>
+          </a:lnRef>
+          <a:fillRef idx="1">
+            <a:schemeClr val="accent1"/>
+          </a:fillRef>
+          <a:effectRef idx="0">
+            <a:schemeClr val="accent1"/>
+          </a:effectRef>
+          <a:fontRef idx="minor">
+            <a:schemeClr val="lt1"/>
+          </a:fontRef>
+        </p:style>
+        <p:txBody>
+          <a:bodyPr rtlCol="0" anchor="ctr"/>
+          <a:lstStyle/>
+          <a:p>
+            <a:pPr algn="ctr"/>
+            <a:endParaRPr lang="en-US" sz="3200"/>
+          </a:p>
+        </p:txBody>
+      </p:sp>
+      <p:sp>
+        <p:nvSpPr>
+          <p:cNvPr id="5" name="TextBox 4">
+            <a:extLst>
+              <a:ext uri="{FF2B5EF4-FFF2-40B4-BE49-F238E27FC236}">
+                <a16:creationId xmlns:a16="http://schemas.microsoft.com/office/drawing/2014/main" id="{D938EA54-22B2-3FC5-3114-C36BB438F322}"/>
+              </a:ext>
+            </a:extLst>
+          </p:cNvPr>
+          <p:cNvSpPr txBox="1"/>
+          <p:nvPr/>
+        </p:nvSpPr>
+        <p:spPr>
+          <a:xfrm>
+            <a:off x="7384473" y="487450"/>
+            <a:ext cx="3481621" cy="338554"/>
+          </a:xfrm>
+          <a:prstGeom prst="rect">
+            <a:avLst/>
+          </a:prstGeom>
+          <a:noFill/>
+        </p:spPr>
+        <p:txBody>
+          <a:bodyPr wrap="square" rtlCol="0">
+            <a:spAutoFit/>
+          </a:bodyPr>
+          <a:lstStyle/>
+          <a:p>
+            <a:r>
+              <a:rPr lang="en-US" sz="1600" dirty="0">
+                <a:latin typeface="Bookman Old Style" panose="02050604050505020204" pitchFamily="18" charset="0"/>
+              </a:rPr>
+              <a:t>Clarisse Justine D. Crisostomo</a:t>
+            </a:r>
+          </a:p>
+        </p:txBody>
+      </p:sp>
+      <p:pic>
+        <p:nvPicPr>
+          <p:cNvPr id="3" name="Graphic 2" descr="House">
+            <a:extLst>
+              <a:ext uri="{FF2B5EF4-FFF2-40B4-BE49-F238E27FC236}">
+                <a16:creationId xmlns:a16="http://schemas.microsoft.com/office/drawing/2014/main" id="{AA05D0AE-52B9-4584-A1AC-0C2D91F6F2E9}"/>
+              </a:ext>
+            </a:extLst>
+          </p:cNvPr>
+          <p:cNvPicPr>
+            <a:picLocks noChangeAspect="1"/>
+          </p:cNvPicPr>
+          <p:nvPr/>
+        </p:nvPicPr>
+        <p:blipFill>
+          <a:blip r:embed="rId3">
+            <a:extLst>
+              <a:ext uri="{28A0092B-C50C-407E-A947-70E740481C1C}">
+                <a14:useLocalDpi xmlns:a14="http://schemas.microsoft.com/office/drawing/2010/main" val="0"/>
+              </a:ext>
+              <a:ext uri="{96DAC541-7B7A-43D3-8B79-37D633B846F1}">
+                <asvg:svgBlip xmlns:asvg="http://schemas.microsoft.com/office/drawing/2016/SVG/main" r:embed="rId4"/>
+              </a:ext>
+            </a:extLst>
+          </a:blip>
+          <a:stretch>
+            <a:fillRect/>
+          </a:stretch>
+        </p:blipFill>
+        <p:spPr>
+          <a:xfrm>
+            <a:off x="314525" y="2455953"/>
+            <a:ext cx="540000" cy="540000"/>
+          </a:xfrm>
+          <a:prstGeom prst="rect">
+            <a:avLst/>
+          </a:prstGeom>
+        </p:spPr>
+      </p:pic>
+      <p:pic>
+        <p:nvPicPr>
+          <p:cNvPr id="7" name="Graphic 6" descr="Employee badge">
+            <a:extLst>
+              <a:ext uri="{FF2B5EF4-FFF2-40B4-BE49-F238E27FC236}">
+                <a16:creationId xmlns:a16="http://schemas.microsoft.com/office/drawing/2014/main" id="{3FFD2829-FD15-428B-9CF5-62BE1DAD7FF9}"/>
+              </a:ext>
+            </a:extLst>
+          </p:cNvPr>
+          <p:cNvPicPr>
+            <a:picLocks noChangeAspect="1"/>
+          </p:cNvPicPr>
+          <p:nvPr/>
+        </p:nvPicPr>
+        <p:blipFill>
+          <a:blip r:embed="rId5">
+            <a:extLst>
+              <a:ext uri="{28A0092B-C50C-407E-A947-70E740481C1C}">
+                <a14:useLocalDpi xmlns:a14="http://schemas.microsoft.com/office/drawing/2010/main" val="0"/>
+              </a:ext>
+              <a:ext uri="{96DAC541-7B7A-43D3-8B79-37D633B846F1}">
+                <asvg:svgBlip xmlns:asvg="http://schemas.microsoft.com/office/drawing/2016/SVG/main" r:embed="rId6"/>
+              </a:ext>
+            </a:extLst>
+          </a:blip>
+          <a:stretch>
+            <a:fillRect/>
+          </a:stretch>
+        </p:blipFill>
+        <p:spPr>
+          <a:xfrm>
+            <a:off x="314525" y="386728"/>
+            <a:ext cx="540000" cy="540000"/>
+          </a:xfrm>
+          <a:prstGeom prst="rect">
+            <a:avLst/>
+          </a:prstGeom>
+        </p:spPr>
+      </p:pic>
+      <p:pic>
+        <p:nvPicPr>
+          <p:cNvPr id="11" name="Graphic 10" descr="Star">
+            <a:hlinkClick r:id="rId7" action="ppaction://hlinksldjump"/>
+            <a:extLst>
+              <a:ext uri="{FF2B5EF4-FFF2-40B4-BE49-F238E27FC236}">
+                <a16:creationId xmlns:a16="http://schemas.microsoft.com/office/drawing/2014/main" id="{4CFFDE08-8C8E-4F00-A16E-E93193EB916E}"/>
+              </a:ext>
+            </a:extLst>
+          </p:cNvPr>
+          <p:cNvPicPr>
+            <a:picLocks noChangeAspect="1"/>
+          </p:cNvPicPr>
+          <p:nvPr/>
+        </p:nvPicPr>
+        <p:blipFill>
+          <a:blip r:embed="rId8">
+            <a:extLst>
+              <a:ext uri="{28A0092B-C50C-407E-A947-70E740481C1C}">
+                <a14:useLocalDpi xmlns:a14="http://schemas.microsoft.com/office/drawing/2010/main" val="0"/>
+              </a:ext>
+              <a:ext uri="{96DAC541-7B7A-43D3-8B79-37D633B846F1}">
+                <asvg:svgBlip xmlns:asvg="http://schemas.microsoft.com/office/drawing/2016/SVG/main" r:embed="rId9"/>
+              </a:ext>
+            </a:extLst>
+          </a:blip>
+          <a:stretch>
+            <a:fillRect/>
+          </a:stretch>
+        </p:blipFill>
+        <p:spPr>
+          <a:xfrm>
+            <a:off x="314525" y="1386705"/>
+            <a:ext cx="540000" cy="540000"/>
+          </a:xfrm>
+          <a:prstGeom prst="rect">
+            <a:avLst/>
+          </a:prstGeom>
+        </p:spPr>
+      </p:pic>
+      <p:pic>
+        <p:nvPicPr>
+          <p:cNvPr id="13" name="Graphic 12" descr="Cake">
+            <a:extLst>
+              <a:ext uri="{FF2B5EF4-FFF2-40B4-BE49-F238E27FC236}">
+                <a16:creationId xmlns:a16="http://schemas.microsoft.com/office/drawing/2014/main" id="{13FA19D8-D5D5-414E-9ED8-7BC64241534A}"/>
+              </a:ext>
+            </a:extLst>
+          </p:cNvPr>
+          <p:cNvPicPr>
+            <a:picLocks noChangeAspect="1"/>
+          </p:cNvPicPr>
+          <p:nvPr/>
+        </p:nvPicPr>
+        <p:blipFill>
+          <a:blip r:embed="rId10">
+            <a:extLst>
+              <a:ext uri="{28A0092B-C50C-407E-A947-70E740481C1C}">
+                <a14:useLocalDpi xmlns:a14="http://schemas.microsoft.com/office/drawing/2010/main" val="0"/>
+              </a:ext>
+              <a:ext uri="{96DAC541-7B7A-43D3-8B79-37D633B846F1}">
+                <asvg:svgBlip xmlns:asvg="http://schemas.microsoft.com/office/drawing/2016/SVG/main" r:embed="rId11"/>
+              </a:ext>
+            </a:extLst>
+          </a:blip>
+          <a:stretch>
+            <a:fillRect/>
+          </a:stretch>
+        </p:blipFill>
+        <p:spPr>
+          <a:xfrm>
+            <a:off x="314525" y="3622183"/>
+            <a:ext cx="540000" cy="540000"/>
+          </a:xfrm>
+          <a:prstGeom prst="rect">
+            <a:avLst/>
+          </a:prstGeom>
+        </p:spPr>
+      </p:pic>
+      <p:pic>
+        <p:nvPicPr>
+          <p:cNvPr id="15" name="Graphic 14" descr="Game controller">
+            <a:extLst>
+              <a:ext uri="{FF2B5EF4-FFF2-40B4-BE49-F238E27FC236}">
+                <a16:creationId xmlns:a16="http://schemas.microsoft.com/office/drawing/2014/main" id="{9B61377B-EF05-4C85-A3CA-870BAD92EFD3}"/>
+              </a:ext>
+            </a:extLst>
+          </p:cNvPr>
+          <p:cNvPicPr>
+            <a:picLocks noChangeAspect="1"/>
+          </p:cNvPicPr>
+          <p:nvPr/>
+        </p:nvPicPr>
+        <p:blipFill>
+          <a:blip r:embed="rId12">
+            <a:extLst>
+              <a:ext uri="{28A0092B-C50C-407E-A947-70E740481C1C}">
+                <a14:useLocalDpi xmlns:a14="http://schemas.microsoft.com/office/drawing/2010/main" val="0"/>
+              </a:ext>
+              <a:ext uri="{96DAC541-7B7A-43D3-8B79-37D633B846F1}">
+                <asvg:svgBlip xmlns:asvg="http://schemas.microsoft.com/office/drawing/2016/SVG/main" r:embed="rId13"/>
+              </a:ext>
+            </a:extLst>
+          </a:blip>
+          <a:stretch>
+            <a:fillRect/>
+          </a:stretch>
+        </p:blipFill>
+        <p:spPr>
+          <a:xfrm>
+            <a:off x="314525" y="4788406"/>
+            <a:ext cx="540000" cy="540000"/>
+          </a:xfrm>
+          <a:prstGeom prst="rect">
+            <a:avLst/>
+          </a:prstGeom>
+        </p:spPr>
+      </p:pic>
+      <p:pic>
+        <p:nvPicPr>
+          <p:cNvPr id="17" name="Graphic 16" descr="Graduation cap">
+            <a:extLst>
+              <a:ext uri="{FF2B5EF4-FFF2-40B4-BE49-F238E27FC236}">
+                <a16:creationId xmlns:a16="http://schemas.microsoft.com/office/drawing/2014/main" id="{09285616-36D5-4147-A29A-BAA22927A959}"/>
+              </a:ext>
+            </a:extLst>
+          </p:cNvPr>
+          <p:cNvPicPr>
+            <a:picLocks noChangeAspect="1"/>
+          </p:cNvPicPr>
+          <p:nvPr/>
+        </p:nvPicPr>
+        <p:blipFill>
+          <a:blip r:embed="rId14">
+            <a:extLst>
+              <a:ext uri="{28A0092B-C50C-407E-A947-70E740481C1C}">
+                <a14:useLocalDpi xmlns:a14="http://schemas.microsoft.com/office/drawing/2010/main" val="0"/>
+              </a:ext>
+              <a:ext uri="{96DAC541-7B7A-43D3-8B79-37D633B846F1}">
+                <asvg:svgBlip xmlns:asvg="http://schemas.microsoft.com/office/drawing/2016/SVG/main" r:embed="rId15"/>
+              </a:ext>
+            </a:extLst>
+          </a:blip>
+          <a:stretch>
+            <a:fillRect/>
+          </a:stretch>
+        </p:blipFill>
+        <p:spPr>
+          <a:xfrm>
+            <a:off x="314525" y="5788392"/>
+            <a:ext cx="540000" cy="540000"/>
+          </a:xfrm>
+          <a:prstGeom prst="rect">
+            <a:avLst/>
+          </a:prstGeom>
+        </p:spPr>
+      </p:pic>
+      <p:sp>
+        <p:nvSpPr>
+          <p:cNvPr id="2" name="Rectangle 1">
+            <a:extLst>
+              <a:ext uri="{FF2B5EF4-FFF2-40B4-BE49-F238E27FC236}">
+                <a16:creationId xmlns:a16="http://schemas.microsoft.com/office/drawing/2014/main" id="{92024206-9DAC-477B-982F-C733B5171BAF}"/>
+              </a:ext>
+            </a:extLst>
+          </p:cNvPr>
+          <p:cNvSpPr/>
+          <p:nvPr/>
+        </p:nvSpPr>
+        <p:spPr>
+          <a:xfrm>
+            <a:off x="2032495" y="1656705"/>
+            <a:ext cx="2788893" cy="4712072"/>
+          </a:xfrm>
+          <a:prstGeom prst="rect">
+            <a:avLst/>
+          </a:prstGeom>
+          <a:solidFill>
+            <a:schemeClr val="accent5">
+              <a:lumMod val="40000"/>
+              <a:lumOff val="60000"/>
+            </a:schemeClr>
+          </a:solidFill>
+          <a:ln>
+            <a:noFill/>
+          </a:ln>
+        </p:spPr>
+        <p:style>
+          <a:lnRef idx="2">
+            <a:schemeClr val="accent1">
+              <a:shade val="50000"/>
+            </a:schemeClr>
+          </a:lnRef>
+          <a:fillRef idx="1">
+            <a:schemeClr val="accent1"/>
+          </a:fillRef>
+          <a:effectRef idx="0">
+            <a:schemeClr val="accent1"/>
+          </a:effectRef>
+          <a:fontRef idx="minor">
+            <a:schemeClr val="lt1"/>
+          </a:fontRef>
+        </p:style>
+        <p:txBody>
+          <a:bodyPr rtlCol="0" anchor="ctr"/>
+          <a:lstStyle/>
+          <a:p>
+            <a:pPr algn="ctr"/>
+            <a:endParaRPr lang="en-PH"/>
+          </a:p>
+        </p:txBody>
+      </p:sp>
+      <p:sp>
+        <p:nvSpPr>
+          <p:cNvPr id="16" name="Rectangle 15">
+            <a:extLst>
+              <a:ext uri="{FF2B5EF4-FFF2-40B4-BE49-F238E27FC236}">
+                <a16:creationId xmlns:a16="http://schemas.microsoft.com/office/drawing/2014/main" id="{843937D0-4C5C-44FA-91A0-01868FAF9FDA}"/>
+              </a:ext>
+            </a:extLst>
+          </p:cNvPr>
+          <p:cNvSpPr/>
+          <p:nvPr/>
+        </p:nvSpPr>
+        <p:spPr>
+          <a:xfrm>
+            <a:off x="5066640" y="1656705"/>
+            <a:ext cx="2788893" cy="4712072"/>
+          </a:xfrm>
+          <a:prstGeom prst="rect">
+            <a:avLst/>
+          </a:prstGeom>
+          <a:blipFill dpi="0" rotWithShape="1">
+            <a:blip r:embed="rId16">
+              <a:extLst>
+                <a:ext uri="{28A0092B-C50C-407E-A947-70E740481C1C}">
+                  <a14:useLocalDpi xmlns:a14="http://schemas.microsoft.com/office/drawing/2010/main" val="0"/>
+                </a:ext>
+              </a:extLst>
+            </a:blip>
+            <a:srcRect/>
+            <a:stretch>
+              <a:fillRect/>
+            </a:stretch>
+          </a:blipFill>
+          <a:ln>
+            <a:noFill/>
+          </a:ln>
+        </p:spPr>
+        <p:style>
+          <a:lnRef idx="2">
+            <a:schemeClr val="accent1">
+              <a:shade val="50000"/>
+            </a:schemeClr>
+          </a:lnRef>
+          <a:fillRef idx="1">
+            <a:schemeClr val="accent1"/>
+          </a:fillRef>
+          <a:effectRef idx="0">
+            <a:schemeClr val="accent1"/>
+          </a:effectRef>
+          <a:fontRef idx="minor">
+            <a:schemeClr val="lt1"/>
+          </a:fontRef>
+        </p:style>
+        <p:txBody>
+          <a:bodyPr rtlCol="0" anchor="ctr"/>
+          <a:lstStyle/>
+          <a:p>
+            <a:pPr algn="ctr"/>
+            <a:endParaRPr lang="en-PH"/>
+          </a:p>
+        </p:txBody>
+      </p:sp>
+      <p:sp>
+        <p:nvSpPr>
+          <p:cNvPr id="19" name="Rectangle 18">
+            <a:extLst>
+              <a:ext uri="{FF2B5EF4-FFF2-40B4-BE49-F238E27FC236}">
+                <a16:creationId xmlns:a16="http://schemas.microsoft.com/office/drawing/2014/main" id="{165CA659-0FA3-44BB-8CBF-7522D7A82C52}"/>
+              </a:ext>
+            </a:extLst>
+          </p:cNvPr>
+          <p:cNvSpPr/>
+          <p:nvPr/>
+        </p:nvSpPr>
+        <p:spPr>
+          <a:xfrm>
+            <a:off x="8100785" y="1656705"/>
+            <a:ext cx="2788893" cy="4712072"/>
+          </a:xfrm>
+          <a:prstGeom prst="rect">
+            <a:avLst/>
+          </a:prstGeom>
+          <a:solidFill>
+            <a:schemeClr val="accent5">
+              <a:lumMod val="40000"/>
+              <a:lumOff val="60000"/>
+            </a:schemeClr>
+          </a:solidFill>
+          <a:ln>
+            <a:noFill/>
+          </a:ln>
+        </p:spPr>
+        <p:style>
+          <a:lnRef idx="2">
+            <a:schemeClr val="accent1">
+              <a:shade val="50000"/>
+            </a:schemeClr>
+          </a:lnRef>
+          <a:fillRef idx="1">
+            <a:schemeClr val="accent1"/>
+          </a:fillRef>
+          <a:effectRef idx="0">
+            <a:schemeClr val="accent1"/>
+          </a:effectRef>
+          <a:fontRef idx="minor">
+            <a:schemeClr val="lt1"/>
+          </a:fontRef>
+        </p:style>
+        <p:txBody>
+          <a:bodyPr rtlCol="0" anchor="ctr"/>
+          <a:lstStyle/>
+          <a:p>
+            <a:pPr algn="ctr"/>
+            <a:endParaRPr lang="en-PH"/>
+          </a:p>
+        </p:txBody>
+      </p:sp>
+      <p:sp>
+        <p:nvSpPr>
+          <p:cNvPr id="8" name="TextBox 7">
+            <a:extLst>
+              <a:ext uri="{FF2B5EF4-FFF2-40B4-BE49-F238E27FC236}">
+                <a16:creationId xmlns:a16="http://schemas.microsoft.com/office/drawing/2014/main" id="{783BC465-42DA-4B03-A721-981A93622FC0}"/>
+              </a:ext>
+            </a:extLst>
+          </p:cNvPr>
+          <p:cNvSpPr txBox="1"/>
+          <p:nvPr/>
+        </p:nvSpPr>
+        <p:spPr>
+          <a:xfrm>
+            <a:off x="2185969" y="1908496"/>
+            <a:ext cx="2481943" cy="4401205"/>
+          </a:xfrm>
+          <a:prstGeom prst="rect">
+            <a:avLst/>
+          </a:prstGeom>
+          <a:noFill/>
+        </p:spPr>
+        <p:txBody>
+          <a:bodyPr wrap="square" rtlCol="0">
+            <a:spAutoFit/>
+          </a:bodyPr>
+          <a:lstStyle/>
+          <a:p>
+            <a:r>
+              <a:rPr lang="en-US" sz="2800" dirty="0"/>
+              <a:t>My name is Clarisse Justine D. Crisostomo</a:t>
+            </a:r>
+          </a:p>
+          <a:p>
+            <a:endParaRPr lang="en-US" sz="2800" dirty="0"/>
+          </a:p>
+          <a:p>
+            <a:r>
+              <a:rPr lang="en-PH" sz="2800" dirty="0"/>
+              <a:t>Born on April 6</a:t>
+            </a:r>
+            <a:r>
+              <a:rPr lang="en-PH" sz="2800" baseline="30000" dirty="0"/>
+              <a:t>th</a:t>
+            </a:r>
+            <a:r>
+              <a:rPr lang="en-PH" sz="2800" dirty="0"/>
+              <a:t> 2000</a:t>
+            </a:r>
+          </a:p>
+          <a:p>
+            <a:endParaRPr lang="en-PH" sz="2800" dirty="0"/>
+          </a:p>
+          <a:p>
+            <a:r>
+              <a:rPr lang="en-PH" sz="2800" dirty="0"/>
+              <a:t>I currently live in </a:t>
+            </a:r>
+            <a:r>
+              <a:rPr lang="en-PH" sz="2800" dirty="0" err="1"/>
+              <a:t>Abucay</a:t>
+            </a:r>
+            <a:r>
+              <a:rPr lang="en-PH" sz="2800" dirty="0"/>
+              <a:t> Bataan.</a:t>
+            </a:r>
+          </a:p>
+        </p:txBody>
+      </p:sp>
+      <p:sp>
+        <p:nvSpPr>
+          <p:cNvPr id="20" name="TextBox 19">
+            <a:extLst>
+              <a:ext uri="{FF2B5EF4-FFF2-40B4-BE49-F238E27FC236}">
+                <a16:creationId xmlns:a16="http://schemas.microsoft.com/office/drawing/2014/main" id="{6DB1E937-E464-4CD8-8D6A-FBD4AFD12AF2}"/>
+              </a:ext>
+            </a:extLst>
+          </p:cNvPr>
+          <p:cNvSpPr txBox="1"/>
+          <p:nvPr/>
+        </p:nvSpPr>
+        <p:spPr>
+          <a:xfrm>
+            <a:off x="8254259" y="2889356"/>
+            <a:ext cx="2481943" cy="2246769"/>
+          </a:xfrm>
+          <a:prstGeom prst="rect">
+            <a:avLst/>
+          </a:prstGeom>
+          <a:noFill/>
+        </p:spPr>
+        <p:txBody>
+          <a:bodyPr wrap="square" rtlCol="0">
+            <a:spAutoFit/>
+          </a:bodyPr>
+          <a:lstStyle/>
+          <a:p>
+            <a:r>
+              <a:rPr lang="en-US" sz="2800"/>
+              <a:t> “I am Qiqi. I am a zombie. And I forgot what comes next.” – Qiqi</a:t>
+            </a:r>
+            <a:endParaRPr lang="en-PH" sz="2800" dirty="0"/>
+          </a:p>
+        </p:txBody>
+      </p:sp>
     </p:spTree>
     <p:extLst>
       <p:ext uri="{BB962C8B-B14F-4D97-AF65-F5344CB8AC3E}">
-        <p14:creationId xmlns:p14="http://schemas.microsoft.com/office/powerpoint/2010/main" val="1789892917"/>
+        <p14:creationId xmlns:p14="http://schemas.microsoft.com/office/powerpoint/2010/main" val="1863904615"/>
       </p:ext>
     </p:extLst>
   </p:cSld>
   <p:clrMapOvr>
     <a:masterClrMapping/>
   </p:clrMapOvr>
+  <mc:AlternateContent xmlns:mc="http://schemas.openxmlformats.org/markup-compatibility/2006">
+    <mc:Choice xmlns:p159="http://schemas.microsoft.com/office/powerpoint/2015/09/main" Requires="p159">
+      <p:transition xmlns:p14="http://schemas.microsoft.com/office/powerpoint/2010/main" spd="slow" p14:dur="2000">
+        <p159:morph option="byObject"/>
+      </p:transition>
+    </mc:Choice>
+    <mc:Fallback>
+      <p:transition spd="slow">
+        <p:fade/>
+      </p:transition>
+    </mc:Fallback>
+  </mc:AlternateContent>
+</p:sld>
+</file>
+
+<file path=ppt/slides/slide3.xml><?xml version="1.0" encoding="utf-8"?>
+<p:sld xmlns:a="http://schemas.openxmlformats.org/drawingml/2006/main" xmlns:r="http://schemas.openxmlformats.org/officeDocument/2006/relationships" xmlns:p="http://schemas.openxmlformats.org/presentationml/2006/main">
+  <p:cSld>
+    <p:spTree>
+      <p:nvGrpSpPr>
+        <p:cNvPr id="1" name=""/>
+        <p:cNvGrpSpPr/>
+        <p:nvPr/>
+      </p:nvGrpSpPr>
+      <p:grpSpPr>
+        <a:xfrm>
+          <a:off x="0" y="0"/>
+          <a:ext cx="0" cy="0"/>
+          <a:chOff x="0" y="0"/>
+          <a:chExt cx="0" cy="0"/>
+        </a:xfrm>
+      </p:grpSpPr>
+      <p:sp>
+        <p:nvSpPr>
+          <p:cNvPr id="18" name="Rectangle 17">
+            <a:extLst>
+              <a:ext uri="{FF2B5EF4-FFF2-40B4-BE49-F238E27FC236}">
+                <a16:creationId xmlns:a16="http://schemas.microsoft.com/office/drawing/2014/main" id="{C603DB2A-DEF6-40F1-BC5B-57D1097EFA3B}"/>
+              </a:ext>
+            </a:extLst>
+          </p:cNvPr>
+          <p:cNvSpPr/>
+          <p:nvPr/>
+        </p:nvSpPr>
+        <p:spPr>
+          <a:xfrm>
+            <a:off x="0" y="0"/>
+            <a:ext cx="1205345" cy="6858000"/>
+          </a:xfrm>
+          <a:prstGeom prst="rect">
+            <a:avLst/>
+          </a:prstGeom>
+          <a:solidFill>
+            <a:schemeClr val="accent5">
+              <a:lumMod val="50000"/>
+            </a:schemeClr>
+          </a:solidFill>
+        </p:spPr>
+        <p:style>
+          <a:lnRef idx="2">
+            <a:schemeClr val="accent1">
+              <a:shade val="50000"/>
+            </a:schemeClr>
+          </a:lnRef>
+          <a:fillRef idx="1">
+            <a:schemeClr val="accent1"/>
+          </a:fillRef>
+          <a:effectRef idx="0">
+            <a:schemeClr val="accent1"/>
+          </a:effectRef>
+          <a:fontRef idx="minor">
+            <a:schemeClr val="lt1"/>
+          </a:fontRef>
+        </p:style>
+        <p:txBody>
+          <a:bodyPr rtlCol="0" anchor="ctr"/>
+          <a:lstStyle/>
+          <a:p>
+            <a:pPr algn="ctr"/>
+            <a:endParaRPr lang="en-PH"/>
+          </a:p>
+        </p:txBody>
+      </p:sp>
+      <p:sp>
+        <p:nvSpPr>
+          <p:cNvPr id="4" name="Oval 3">
+            <a:extLst>
+              <a:ext uri="{FF2B5EF4-FFF2-40B4-BE49-F238E27FC236}">
+                <a16:creationId xmlns:a16="http://schemas.microsoft.com/office/drawing/2014/main" id="{3E2ED4DB-FAD7-36C9-D613-441D008FF821}"/>
+              </a:ext>
+            </a:extLst>
+          </p:cNvPr>
+          <p:cNvSpPr/>
+          <p:nvPr/>
+        </p:nvSpPr>
+        <p:spPr>
+          <a:xfrm>
+            <a:off x="10866094" y="64014"/>
+            <a:ext cx="1205345" cy="1185427"/>
+          </a:xfrm>
+          <a:prstGeom prst="ellipse">
+            <a:avLst/>
+          </a:prstGeom>
+          <a:blipFill dpi="0" rotWithShape="1">
+            <a:blip r:embed="rId2">
+              <a:extLst>
+                <a:ext uri="{28A0092B-C50C-407E-A947-70E740481C1C}">
+                  <a14:useLocalDpi xmlns:a14="http://schemas.microsoft.com/office/drawing/2010/main" val="0"/>
+                </a:ext>
+              </a:extLst>
+            </a:blip>
+            <a:srcRect/>
+            <a:stretch>
+              <a:fillRect/>
+            </a:stretch>
+          </a:blipFill>
+          <a:ln>
+            <a:noFill/>
+          </a:ln>
+        </p:spPr>
+        <p:style>
+          <a:lnRef idx="2">
+            <a:schemeClr val="accent1">
+              <a:shade val="50000"/>
+            </a:schemeClr>
+          </a:lnRef>
+          <a:fillRef idx="1">
+            <a:schemeClr val="accent1"/>
+          </a:fillRef>
+          <a:effectRef idx="0">
+            <a:schemeClr val="accent1"/>
+          </a:effectRef>
+          <a:fontRef idx="minor">
+            <a:schemeClr val="lt1"/>
+          </a:fontRef>
+        </p:style>
+        <p:txBody>
+          <a:bodyPr rtlCol="0" anchor="ctr"/>
+          <a:lstStyle/>
+          <a:p>
+            <a:pPr algn="ctr"/>
+            <a:endParaRPr lang="en-US" sz="3200"/>
+          </a:p>
+        </p:txBody>
+      </p:sp>
+      <p:sp>
+        <p:nvSpPr>
+          <p:cNvPr id="5" name="TextBox 4">
+            <a:extLst>
+              <a:ext uri="{FF2B5EF4-FFF2-40B4-BE49-F238E27FC236}">
+                <a16:creationId xmlns:a16="http://schemas.microsoft.com/office/drawing/2014/main" id="{D938EA54-22B2-3FC5-3114-C36BB438F322}"/>
+              </a:ext>
+            </a:extLst>
+          </p:cNvPr>
+          <p:cNvSpPr txBox="1"/>
+          <p:nvPr/>
+        </p:nvSpPr>
+        <p:spPr>
+          <a:xfrm>
+            <a:off x="7384473" y="487450"/>
+            <a:ext cx="3481621" cy="338554"/>
+          </a:xfrm>
+          <a:prstGeom prst="rect">
+            <a:avLst/>
+          </a:prstGeom>
+          <a:noFill/>
+        </p:spPr>
+        <p:txBody>
+          <a:bodyPr wrap="square" rtlCol="0">
+            <a:spAutoFit/>
+          </a:bodyPr>
+          <a:lstStyle/>
+          <a:p>
+            <a:r>
+              <a:rPr lang="en-US" sz="1600" dirty="0">
+                <a:latin typeface="Bookman Old Style" panose="02050604050505020204" pitchFamily="18" charset="0"/>
+              </a:rPr>
+              <a:t>Clarisse Justine D. Crisostomo</a:t>
+            </a:r>
+          </a:p>
+        </p:txBody>
+      </p:sp>
+      <p:pic>
+        <p:nvPicPr>
+          <p:cNvPr id="3" name="Graphic 2" descr="House">
+            <a:extLst>
+              <a:ext uri="{FF2B5EF4-FFF2-40B4-BE49-F238E27FC236}">
+                <a16:creationId xmlns:a16="http://schemas.microsoft.com/office/drawing/2014/main" id="{AA05D0AE-52B9-4584-A1AC-0C2D91F6F2E9}"/>
+              </a:ext>
+            </a:extLst>
+          </p:cNvPr>
+          <p:cNvPicPr>
+            <a:picLocks noChangeAspect="1"/>
+          </p:cNvPicPr>
+          <p:nvPr/>
+        </p:nvPicPr>
+        <p:blipFill>
+          <a:blip r:embed="rId3">
+            <a:extLst>
+              <a:ext uri="{28A0092B-C50C-407E-A947-70E740481C1C}">
+                <a14:useLocalDpi xmlns:a14="http://schemas.microsoft.com/office/drawing/2010/main" val="0"/>
+              </a:ext>
+              <a:ext uri="{96DAC541-7B7A-43D3-8B79-37D633B846F1}">
+                <asvg:svgBlip xmlns:asvg="http://schemas.microsoft.com/office/drawing/2016/SVG/main" r:embed="rId4"/>
+              </a:ext>
+            </a:extLst>
+          </a:blip>
+          <a:stretch>
+            <a:fillRect/>
+          </a:stretch>
+        </p:blipFill>
+        <p:spPr>
+          <a:xfrm>
+            <a:off x="314525" y="2455953"/>
+            <a:ext cx="540000" cy="540000"/>
+          </a:xfrm>
+          <a:prstGeom prst="rect">
+            <a:avLst/>
+          </a:prstGeom>
+        </p:spPr>
+      </p:pic>
+      <p:pic>
+        <p:nvPicPr>
+          <p:cNvPr id="7" name="Graphic 6" descr="Employee badge">
+            <a:extLst>
+              <a:ext uri="{FF2B5EF4-FFF2-40B4-BE49-F238E27FC236}">
+                <a16:creationId xmlns:a16="http://schemas.microsoft.com/office/drawing/2014/main" id="{3FFD2829-FD15-428B-9CF5-62BE1DAD7FF9}"/>
+              </a:ext>
+            </a:extLst>
+          </p:cNvPr>
+          <p:cNvPicPr>
+            <a:picLocks noChangeAspect="1"/>
+          </p:cNvPicPr>
+          <p:nvPr/>
+        </p:nvPicPr>
+        <p:blipFill>
+          <a:blip r:embed="rId5">
+            <a:extLst>
+              <a:ext uri="{28A0092B-C50C-407E-A947-70E740481C1C}">
+                <a14:useLocalDpi xmlns:a14="http://schemas.microsoft.com/office/drawing/2010/main" val="0"/>
+              </a:ext>
+              <a:ext uri="{96DAC541-7B7A-43D3-8B79-37D633B846F1}">
+                <asvg:svgBlip xmlns:asvg="http://schemas.microsoft.com/office/drawing/2016/SVG/main" r:embed="rId6"/>
+              </a:ext>
+            </a:extLst>
+          </a:blip>
+          <a:stretch>
+            <a:fillRect/>
+          </a:stretch>
+        </p:blipFill>
+        <p:spPr>
+          <a:xfrm>
+            <a:off x="314525" y="386728"/>
+            <a:ext cx="540000" cy="540000"/>
+          </a:xfrm>
+          <a:prstGeom prst="rect">
+            <a:avLst/>
+          </a:prstGeom>
+        </p:spPr>
+      </p:pic>
+      <p:pic>
+        <p:nvPicPr>
+          <p:cNvPr id="11" name="Graphic 10" descr="Star">
+            <a:extLst>
+              <a:ext uri="{FF2B5EF4-FFF2-40B4-BE49-F238E27FC236}">
+                <a16:creationId xmlns:a16="http://schemas.microsoft.com/office/drawing/2014/main" id="{4CFFDE08-8C8E-4F00-A16E-E93193EB916E}"/>
+              </a:ext>
+            </a:extLst>
+          </p:cNvPr>
+          <p:cNvPicPr>
+            <a:picLocks noChangeAspect="1"/>
+          </p:cNvPicPr>
+          <p:nvPr/>
+        </p:nvPicPr>
+        <p:blipFill>
+          <a:blip r:embed="rId7">
+            <a:extLst>
+              <a:ext uri="{28A0092B-C50C-407E-A947-70E740481C1C}">
+                <a14:useLocalDpi xmlns:a14="http://schemas.microsoft.com/office/drawing/2010/main" val="0"/>
+              </a:ext>
+              <a:ext uri="{96DAC541-7B7A-43D3-8B79-37D633B846F1}">
+                <asvg:svgBlip xmlns:asvg="http://schemas.microsoft.com/office/drawing/2016/SVG/main" r:embed="rId8"/>
+              </a:ext>
+            </a:extLst>
+          </a:blip>
+          <a:stretch>
+            <a:fillRect/>
+          </a:stretch>
+        </p:blipFill>
+        <p:spPr>
+          <a:xfrm>
+            <a:off x="314525" y="1386705"/>
+            <a:ext cx="540000" cy="540000"/>
+          </a:xfrm>
+          <a:prstGeom prst="rect">
+            <a:avLst/>
+          </a:prstGeom>
+        </p:spPr>
+      </p:pic>
+      <p:pic>
+        <p:nvPicPr>
+          <p:cNvPr id="13" name="Graphic 12" descr="Cake">
+            <a:extLst>
+              <a:ext uri="{FF2B5EF4-FFF2-40B4-BE49-F238E27FC236}">
+                <a16:creationId xmlns:a16="http://schemas.microsoft.com/office/drawing/2014/main" id="{13FA19D8-D5D5-414E-9ED8-7BC64241534A}"/>
+              </a:ext>
+            </a:extLst>
+          </p:cNvPr>
+          <p:cNvPicPr>
+            <a:picLocks noChangeAspect="1"/>
+          </p:cNvPicPr>
+          <p:nvPr/>
+        </p:nvPicPr>
+        <p:blipFill>
+          <a:blip r:embed="rId9">
+            <a:extLst>
+              <a:ext uri="{28A0092B-C50C-407E-A947-70E740481C1C}">
+                <a14:useLocalDpi xmlns:a14="http://schemas.microsoft.com/office/drawing/2010/main" val="0"/>
+              </a:ext>
+              <a:ext uri="{96DAC541-7B7A-43D3-8B79-37D633B846F1}">
+                <asvg:svgBlip xmlns:asvg="http://schemas.microsoft.com/office/drawing/2016/SVG/main" r:embed="rId10"/>
+              </a:ext>
+            </a:extLst>
+          </a:blip>
+          <a:stretch>
+            <a:fillRect/>
+          </a:stretch>
+        </p:blipFill>
+        <p:spPr>
+          <a:xfrm>
+            <a:off x="314525" y="3622183"/>
+            <a:ext cx="540000" cy="540000"/>
+          </a:xfrm>
+          <a:prstGeom prst="rect">
+            <a:avLst/>
+          </a:prstGeom>
+        </p:spPr>
+      </p:pic>
+      <p:pic>
+        <p:nvPicPr>
+          <p:cNvPr id="15" name="Graphic 14" descr="Game controller">
+            <a:extLst>
+              <a:ext uri="{FF2B5EF4-FFF2-40B4-BE49-F238E27FC236}">
+                <a16:creationId xmlns:a16="http://schemas.microsoft.com/office/drawing/2014/main" id="{9B61377B-EF05-4C85-A3CA-870BAD92EFD3}"/>
+              </a:ext>
+            </a:extLst>
+          </p:cNvPr>
+          <p:cNvPicPr>
+            <a:picLocks noChangeAspect="1"/>
+          </p:cNvPicPr>
+          <p:nvPr/>
+        </p:nvPicPr>
+        <p:blipFill>
+          <a:blip r:embed="rId11">
+            <a:extLst>
+              <a:ext uri="{28A0092B-C50C-407E-A947-70E740481C1C}">
+                <a14:useLocalDpi xmlns:a14="http://schemas.microsoft.com/office/drawing/2010/main" val="0"/>
+              </a:ext>
+              <a:ext uri="{96DAC541-7B7A-43D3-8B79-37D633B846F1}">
+                <asvg:svgBlip xmlns:asvg="http://schemas.microsoft.com/office/drawing/2016/SVG/main" r:embed="rId12"/>
+              </a:ext>
+            </a:extLst>
+          </a:blip>
+          <a:stretch>
+            <a:fillRect/>
+          </a:stretch>
+        </p:blipFill>
+        <p:spPr>
+          <a:xfrm>
+            <a:off x="314525" y="4788406"/>
+            <a:ext cx="540000" cy="540000"/>
+          </a:xfrm>
+          <a:prstGeom prst="rect">
+            <a:avLst/>
+          </a:prstGeom>
+        </p:spPr>
+      </p:pic>
+      <p:pic>
+        <p:nvPicPr>
+          <p:cNvPr id="17" name="Graphic 16" descr="Graduation cap">
+            <a:extLst>
+              <a:ext uri="{FF2B5EF4-FFF2-40B4-BE49-F238E27FC236}">
+                <a16:creationId xmlns:a16="http://schemas.microsoft.com/office/drawing/2014/main" id="{09285616-36D5-4147-A29A-BAA22927A959}"/>
+              </a:ext>
+            </a:extLst>
+          </p:cNvPr>
+          <p:cNvPicPr>
+            <a:picLocks noChangeAspect="1"/>
+          </p:cNvPicPr>
+          <p:nvPr/>
+        </p:nvPicPr>
+        <p:blipFill>
+          <a:blip r:embed="rId13">
+            <a:extLst>
+              <a:ext uri="{28A0092B-C50C-407E-A947-70E740481C1C}">
+                <a14:useLocalDpi xmlns:a14="http://schemas.microsoft.com/office/drawing/2010/main" val="0"/>
+              </a:ext>
+              <a:ext uri="{96DAC541-7B7A-43D3-8B79-37D633B846F1}">
+                <asvg:svgBlip xmlns:asvg="http://schemas.microsoft.com/office/drawing/2016/SVG/main" r:embed="rId14"/>
+              </a:ext>
+            </a:extLst>
+          </a:blip>
+          <a:stretch>
+            <a:fillRect/>
+          </a:stretch>
+        </p:blipFill>
+        <p:spPr>
+          <a:xfrm>
+            <a:off x="314525" y="5788392"/>
+            <a:ext cx="540000" cy="540000"/>
+          </a:xfrm>
+          <a:prstGeom prst="rect">
+            <a:avLst/>
+          </a:prstGeom>
+        </p:spPr>
+      </p:pic>
+    </p:spTree>
+    <p:extLst>
+      <p:ext uri="{BB962C8B-B14F-4D97-AF65-F5344CB8AC3E}">
+        <p14:creationId xmlns:p14="http://schemas.microsoft.com/office/powerpoint/2010/main" val="1400327988"/>
+      </p:ext>
+    </p:extLst>
+  </p:cSld>
+  <p:clrMapOvr>
+    <a:masterClrMapping/>
+  </p:clrMapOvr>
+  <mc:AlternateContent xmlns:mc="http://schemas.openxmlformats.org/markup-compatibility/2006">
+    <mc:Choice xmlns:p159="http://schemas.microsoft.com/office/powerpoint/2015/09/main" Requires="p159">
+      <p:transition xmlns:p14="http://schemas.microsoft.com/office/powerpoint/2010/main" spd="slow" p14:dur="2000">
+        <p159:morph option="byObject"/>
+      </p:transition>
+    </mc:Choice>
+    <mc:Fallback>
+      <p:transition spd="slow">
+        <p:fade/>
+      </p:transition>
+    </mc:Fallback>
+  </mc:AlternateContent>
 </p:sld>
 </file>
 

</xml_diff>